<commit_message>
more on Lesson 6
</commit_message>
<xml_diff>
--- a/UM_DataManagementClass/Lessons/06/06_FirstMeeting.pptx
+++ b/UM_DataManagementClass/Lessons/06/06_FirstMeeting.pptx
@@ -5,11 +5,13 @@
     <p:sldMasterId id="2147483756" r:id="rId1"/>
   </p:sldMasterIdLst>
   <p:notesMasterIdLst>
-    <p:notesMasterId r:id="rId4"/>
+    <p:notesMasterId r:id="rId6"/>
   </p:notesMasterIdLst>
   <p:sldIdLst>
     <p:sldId id="256" r:id="rId2"/>
     <p:sldId id="262" r:id="rId3"/>
+    <p:sldId id="263" r:id="rId4"/>
+    <p:sldId id="264" r:id="rId5"/>
   </p:sldIdLst>
   <p:sldSz cx="12192000" cy="6858000"/>
   <p:notesSz cx="7010400" cy="9296400"/>
@@ -4362,20 +4364,23 @@
           <a:p>
             <a:r>
               <a:rPr lang="en-US" dirty="0" smtClean="0"/>
-              <a:t>When do you need security</a:t>
-            </a:r>
+              <a:t>What is a DCP</a:t>
+            </a:r>
+            <a:endParaRPr lang="en-US" dirty="0" smtClean="0"/>
           </a:p>
           <a:p>
             <a:r>
               <a:rPr lang="en-US" dirty="0" smtClean="0"/>
-              <a:t>Human Subjects and PII</a:t>
-            </a:r>
+              <a:t>The toolkit</a:t>
+            </a:r>
+            <a:endParaRPr lang="en-US" dirty="0" smtClean="0"/>
           </a:p>
           <a:p>
             <a:r>
               <a:rPr lang="en-US" dirty="0" smtClean="0"/>
-              <a:t>Best Practices</a:t>
-            </a:r>
+              <a:t>An example</a:t>
+            </a:r>
+            <a:endParaRPr lang="en-US" dirty="0" smtClean="0"/>
           </a:p>
           <a:p>
             <a:endParaRPr lang="en-US" dirty="0" smtClean="0"/>
@@ -4399,6 +4404,238 @@
       </p:par>
     </p:tnLst>
   </p:timing>
+</p:sld>
+</file>
+
+<file path=ppt/slides/slide3.xml><?xml version="1.0" encoding="utf-8"?>
+<p:sld xmlns:a="http://schemas.openxmlformats.org/drawingml/2006/main" xmlns:r="http://schemas.openxmlformats.org/officeDocument/2006/relationships" xmlns:p="http://schemas.openxmlformats.org/presentationml/2006/main">
+  <p:cSld>
+    <p:spTree>
+      <p:nvGrpSpPr>
+        <p:cNvPr id="1" name=""/>
+        <p:cNvGrpSpPr/>
+        <p:nvPr/>
+      </p:nvGrpSpPr>
+      <p:grpSpPr>
+        <a:xfrm>
+          <a:off x="0" y="0"/>
+          <a:ext cx="0" cy="0"/>
+          <a:chOff x="0" y="0"/>
+          <a:chExt cx="0" cy="0"/>
+        </a:xfrm>
+      </p:grpSpPr>
+      <p:sp>
+        <p:nvSpPr>
+          <p:cNvPr id="2" name="Title 1"/>
+          <p:cNvSpPr>
+            <a:spLocks noGrp="1"/>
+          </p:cNvSpPr>
+          <p:nvPr>
+            <p:ph type="title"/>
+          </p:nvPr>
+        </p:nvSpPr>
+        <p:spPr/>
+        <p:txBody>
+          <a:bodyPr/>
+          <a:lstStyle/>
+          <a:p>
+            <a:r>
+              <a:rPr lang="en-US" dirty="0" smtClean="0"/>
+              <a:t>The data story</a:t>
+            </a:r>
+            <a:endParaRPr lang="en-US" dirty="0"/>
+          </a:p>
+        </p:txBody>
+      </p:sp>
+      <p:sp>
+        <p:nvSpPr>
+          <p:cNvPr id="3" name="Content Placeholder 2"/>
+          <p:cNvSpPr>
+            <a:spLocks noGrp="1"/>
+          </p:cNvSpPr>
+          <p:nvPr>
+            <p:ph idx="1"/>
+          </p:nvPr>
+        </p:nvSpPr>
+        <p:spPr>
+          <a:xfrm>
+            <a:off x="2635624" y="1825625"/>
+            <a:ext cx="8718176" cy="4351338"/>
+          </a:xfrm>
+        </p:spPr>
+        <p:txBody>
+          <a:bodyPr/>
+          <a:lstStyle/>
+          <a:p>
+            <a:r>
+              <a:rPr lang="en-US" dirty="0" smtClean="0"/>
+              <a:t>Specific data set or research project</a:t>
+            </a:r>
+          </a:p>
+          <a:p>
+            <a:r>
+              <a:rPr lang="en-US" dirty="0" smtClean="0"/>
+              <a:t>Conversation and perhaps a survey form to fill out</a:t>
+            </a:r>
+          </a:p>
+          <a:p>
+            <a:r>
+              <a:rPr lang="en-US" dirty="0" smtClean="0"/>
+              <a:t>Could be done with any discipline (?) or any kind of data (?)</a:t>
+            </a:r>
+          </a:p>
+          <a:p>
+            <a:r>
+              <a:rPr lang="en-US" dirty="0" smtClean="0"/>
+              <a:t>Perhaps choose parts/components to use from the toolkit</a:t>
+            </a:r>
+            <a:endParaRPr lang="en-US" dirty="0"/>
+          </a:p>
+        </p:txBody>
+      </p:sp>
+      <p:sp>
+        <p:nvSpPr>
+          <p:cNvPr id="4" name="Title 1"/>
+          <p:cNvSpPr txBox="1">
+            <a:spLocks/>
+          </p:cNvSpPr>
+          <p:nvPr/>
+        </p:nvSpPr>
+        <p:spPr>
+          <a:xfrm>
+            <a:off x="947570" y="4368765"/>
+            <a:ext cx="10515600" cy="1325563"/>
+          </a:xfrm>
+          <a:prstGeom prst="rect">
+            <a:avLst/>
+          </a:prstGeom>
+        </p:spPr>
+        <p:txBody>
+          <a:bodyPr vert="horz" lIns="91440" tIns="45720" rIns="91440" bIns="45720" rtlCol="0" anchor="ctr">
+            <a:normAutofit/>
+          </a:bodyPr>
+          <a:lstStyle>
+            <a:lvl1pPr algn="ctr" defTabSz="914400" rtl="0" eaLnBrk="1" latinLnBrk="0" hangingPunct="1">
+              <a:lnSpc>
+                <a:spcPct val="90000"/>
+              </a:lnSpc>
+              <a:spcBef>
+                <a:spcPct val="0"/>
+              </a:spcBef>
+              <a:buNone/>
+              <a:defRPr sz="3200" b="1" kern="1200">
+                <a:solidFill>
+                  <a:schemeClr val="tx1"/>
+                </a:solidFill>
+                <a:latin typeface="+mn-lt"/>
+                <a:ea typeface="+mj-ea"/>
+                <a:cs typeface="+mj-cs"/>
+              </a:defRPr>
+            </a:lvl1pPr>
+          </a:lstStyle>
+          <a:p>
+            <a:r>
+              <a:rPr lang="en-US" dirty="0" smtClean="0"/>
+              <a:t>this is social science</a:t>
+            </a:r>
+            <a:endParaRPr lang="en-US" dirty="0"/>
+          </a:p>
+        </p:txBody>
+      </p:sp>
+    </p:spTree>
+    <p:extLst>
+      <p:ext uri="{BB962C8B-B14F-4D97-AF65-F5344CB8AC3E}">
+        <p14:creationId xmlns:p14="http://schemas.microsoft.com/office/powerpoint/2010/main" val="3494193959"/>
+      </p:ext>
+    </p:extLst>
+  </p:cSld>
+  <p:clrMapOvr>
+    <a:masterClrMapping/>
+  </p:clrMapOvr>
+</p:sld>
+</file>
+
+<file path=ppt/slides/slide4.xml><?xml version="1.0" encoding="utf-8"?>
+<p:sld xmlns:a="http://schemas.openxmlformats.org/drawingml/2006/main" xmlns:r="http://schemas.openxmlformats.org/officeDocument/2006/relationships" xmlns:p="http://schemas.openxmlformats.org/presentationml/2006/main">
+  <p:cSld>
+    <p:spTree>
+      <p:nvGrpSpPr>
+        <p:cNvPr id="1" name=""/>
+        <p:cNvGrpSpPr/>
+        <p:nvPr/>
+      </p:nvGrpSpPr>
+      <p:grpSpPr>
+        <a:xfrm>
+          <a:off x="0" y="0"/>
+          <a:ext cx="0" cy="0"/>
+          <a:chOff x="0" y="0"/>
+          <a:chExt cx="0" cy="0"/>
+        </a:xfrm>
+      </p:grpSpPr>
+      <p:sp>
+        <p:nvSpPr>
+          <p:cNvPr id="2" name="Title 1"/>
+          <p:cNvSpPr>
+            <a:spLocks noGrp="1"/>
+          </p:cNvSpPr>
+          <p:nvPr>
+            <p:ph type="title"/>
+          </p:nvPr>
+        </p:nvSpPr>
+        <p:spPr/>
+        <p:txBody>
+          <a:bodyPr/>
+          <a:lstStyle/>
+          <a:p>
+            <a:r>
+              <a:rPr lang="en-US" dirty="0" smtClean="0"/>
+              <a:t>The original idea</a:t>
+            </a:r>
+            <a:endParaRPr lang="en-US" dirty="0"/>
+          </a:p>
+        </p:txBody>
+      </p:sp>
+      <p:sp>
+        <p:nvSpPr>
+          <p:cNvPr id="3" name="Content Placeholder 2"/>
+          <p:cNvSpPr>
+            <a:spLocks noGrp="1"/>
+          </p:cNvSpPr>
+          <p:nvPr>
+            <p:ph idx="1"/>
+          </p:nvPr>
+        </p:nvSpPr>
+        <p:spPr/>
+        <p:txBody>
+          <a:bodyPr/>
+          <a:lstStyle/>
+          <a:p>
+            <a:r>
+              <a:rPr lang="en-US" dirty="0" smtClean="0"/>
+              <a:t>Represents researcher needs and perspectives</a:t>
+            </a:r>
+          </a:p>
+          <a:p>
+            <a:r>
+              <a:rPr lang="en-US" dirty="0" smtClean="0"/>
+              <a:t>Suitable for sharing (inform the library community) (?)</a:t>
+            </a:r>
+          </a:p>
+          <a:p>
+            <a:endParaRPr lang="en-US" dirty="0"/>
+          </a:p>
+        </p:txBody>
+      </p:sp>
+    </p:spTree>
+    <p:extLst>
+      <p:ext uri="{BB962C8B-B14F-4D97-AF65-F5344CB8AC3E}">
+        <p14:creationId xmlns:p14="http://schemas.microsoft.com/office/powerpoint/2010/main" val="1469221093"/>
+      </p:ext>
+    </p:extLst>
+  </p:cSld>
+  <p:clrMapOvr>
+    <a:masterClrMapping/>
+  </p:clrMapOvr>
 </p:sld>
 </file>
 

</xml_diff>